<commit_message>
Added links for website and modified presentation's file
</commit_message>
<xml_diff>
--- a/Documents/Presentation/Prop-Presentation.pptx
+++ b/Documents/Presentation/Prop-Presentation.pptx
@@ -22,16 +22,16 @@
   <p:notesSz cx="6858000" cy="9144000"/>
   <p:embeddedFontLst>
     <p:embeddedFont>
-      <p:font typeface="Lato" panose="020B0604020202020204" charset="0"/>
+      <p:font typeface="Raleway" panose="020B0604020202020204" charset="0"/>
       <p:regular r:id="rId10"/>
       <p:bold r:id="rId11"/>
-      <p:italic r:id="rId12"/>
-      <p:boldItalic r:id="rId13"/>
     </p:embeddedFont>
     <p:embeddedFont>
-      <p:font typeface="Raleway" panose="020B0604020202020204" charset="0"/>
-      <p:regular r:id="rId14"/>
-      <p:bold r:id="rId15"/>
+      <p:font typeface="Lato" panose="020B0604020202020204" charset="0"/>
+      <p:regular r:id="rId12"/>
+      <p:bold r:id="rId13"/>
+      <p:italic r:id="rId14"/>
+      <p:boldItalic r:id="rId15"/>
     </p:embeddedFont>
   </p:embeddedFontLst>
   <p:defaultTextStyle>
@@ -245,6 +245,14 @@
       </a:defRPr>
     </a:lvl9pPr>
   </p:defaultTextStyle>
+  <p:extLst>
+    <p:ext uri="{EFAFB233-063F-42B5-8137-9DF3F51BA10A}">
+      <p15:sldGuideLst xmlns:p15="http://schemas.microsoft.com/office/powerpoint/2012/main"/>
+    </p:ext>
+    <p:ext uri="{2D200454-40CA-4A62-9FC3-DE9A4176ACB9}">
+      <p15:notesGuideLst xmlns:p15="http://schemas.microsoft.com/office/powerpoint/2012/main"/>
+    </p:ext>
+  </p:extLst>
 </p:presentation>
 </file>
 
@@ -330,7 +338,7 @@
           <a:p>
             <a:fld id="{FEBEB24F-E633-40E1-BB93-9B580BD43BF6}" type="datetimeFigureOut">
               <a:rPr lang="en-US" smtClean="0"/>
-              <a:t>1/18/2016</a:t>
+              <a:t>1/25/2016</a:t>
             </a:fld>
             <a:endParaRPr lang="en-US"/>
           </a:p>
@@ -3537,6 +3545,399 @@
           </a:p>
         </p:txBody>
       </p:sp>
+      <p:sp>
+        <p:nvSpPr>
+          <p:cNvPr id="3" name="Shape 289"/>
+          <p:cNvSpPr txBox="1">
+            <a:spLocks/>
+          </p:cNvSpPr>
+          <p:nvPr/>
+        </p:nvSpPr>
+        <p:spPr>
+          <a:xfrm>
+            <a:off x="924655" y="2358072"/>
+            <a:ext cx="7555946" cy="2965042"/>
+          </a:xfrm>
+          <a:prstGeom prst="rect">
+            <a:avLst/>
+          </a:prstGeom>
+          <a:noFill/>
+          <a:ln>
+            <a:noFill/>
+          </a:ln>
+        </p:spPr>
+        <p:txBody>
+          <a:bodyPr lIns="91425" tIns="91425" rIns="91425" bIns="91425" anchor="ctr" anchorCtr="0">
+            <a:noAutofit/>
+          </a:bodyPr>
+          <a:lstStyle>
+            <a:defPPr marR="0" lvl="0" algn="l" rtl="0">
+              <a:lnSpc>
+                <a:spcPct val="100000"/>
+              </a:lnSpc>
+              <a:spcBef>
+                <a:spcPts val="0"/>
+              </a:spcBef>
+              <a:spcAft>
+                <a:spcPts val="0"/>
+              </a:spcAft>
+            </a:defPPr>
+            <a:lvl1pPr marR="0" lvl="0" algn="l" rtl="0">
+              <a:lnSpc>
+                <a:spcPct val="100000"/>
+              </a:lnSpc>
+              <a:spcBef>
+                <a:spcPts val="600"/>
+              </a:spcBef>
+              <a:spcAft>
+                <a:spcPts val="0"/>
+              </a:spcAft>
+              <a:buClr>
+                <a:srgbClr val="677480"/>
+              </a:buClr>
+              <a:buSzPct val="100000"/>
+              <a:buFont typeface="Lato"/>
+              <a:buChar char="▷"/>
+              <a:defRPr sz="3000" b="0" i="0" u="none" strike="noStrike" cap="none">
+                <a:solidFill>
+                  <a:srgbClr val="677480"/>
+                </a:solidFill>
+                <a:latin typeface="Lato"/>
+                <a:ea typeface="Lato"/>
+                <a:cs typeface="Lato"/>
+                <a:sym typeface="Lato"/>
+                <a:rtl val="0"/>
+              </a:defRPr>
+            </a:lvl1pPr>
+            <a:lvl2pPr marR="0" lvl="1" algn="l" rtl="0">
+              <a:lnSpc>
+                <a:spcPct val="100000"/>
+              </a:lnSpc>
+              <a:spcBef>
+                <a:spcPts val="480"/>
+              </a:spcBef>
+              <a:spcAft>
+                <a:spcPts val="0"/>
+              </a:spcAft>
+              <a:buClr>
+                <a:srgbClr val="677480"/>
+              </a:buClr>
+              <a:buSzPct val="100000"/>
+              <a:buFont typeface="Lato"/>
+              <a:buNone/>
+              <a:defRPr sz="2400" b="0" i="0" u="none" strike="noStrike" cap="none">
+                <a:solidFill>
+                  <a:srgbClr val="677480"/>
+                </a:solidFill>
+                <a:latin typeface="Lato"/>
+                <a:ea typeface="Lato"/>
+                <a:cs typeface="Lato"/>
+                <a:sym typeface="Lato"/>
+                <a:rtl val="0"/>
+              </a:defRPr>
+            </a:lvl2pPr>
+            <a:lvl3pPr marR="0" lvl="2" algn="l" rtl="0">
+              <a:lnSpc>
+                <a:spcPct val="100000"/>
+              </a:lnSpc>
+              <a:spcBef>
+                <a:spcPts val="480"/>
+              </a:spcBef>
+              <a:spcAft>
+                <a:spcPts val="0"/>
+              </a:spcAft>
+              <a:buClr>
+                <a:srgbClr val="677480"/>
+              </a:buClr>
+              <a:buSzPct val="100000"/>
+              <a:buFont typeface="Lato"/>
+              <a:buNone/>
+              <a:defRPr sz="2400" b="0" i="0" u="none" strike="noStrike" cap="none">
+                <a:solidFill>
+                  <a:srgbClr val="677480"/>
+                </a:solidFill>
+                <a:latin typeface="Lato"/>
+                <a:ea typeface="Lato"/>
+                <a:cs typeface="Lato"/>
+                <a:sym typeface="Lato"/>
+                <a:rtl val="0"/>
+              </a:defRPr>
+            </a:lvl3pPr>
+            <a:lvl4pPr marR="0" lvl="3" algn="l" rtl="0">
+              <a:lnSpc>
+                <a:spcPct val="100000"/>
+              </a:lnSpc>
+              <a:spcBef>
+                <a:spcPts val="360"/>
+              </a:spcBef>
+              <a:spcAft>
+                <a:spcPts val="0"/>
+              </a:spcAft>
+              <a:buClr>
+                <a:srgbClr val="677480"/>
+              </a:buClr>
+              <a:buSzPct val="100000"/>
+              <a:buFont typeface="Lato"/>
+              <a:buNone/>
+              <a:defRPr sz="1800" b="0" i="0" u="none" strike="noStrike" cap="none">
+                <a:solidFill>
+                  <a:srgbClr val="677480"/>
+                </a:solidFill>
+                <a:latin typeface="Lato"/>
+                <a:ea typeface="Lato"/>
+                <a:cs typeface="Lato"/>
+                <a:sym typeface="Lato"/>
+                <a:rtl val="0"/>
+              </a:defRPr>
+            </a:lvl4pPr>
+            <a:lvl5pPr marR="0" lvl="4" algn="l" rtl="0">
+              <a:lnSpc>
+                <a:spcPct val="100000"/>
+              </a:lnSpc>
+              <a:spcBef>
+                <a:spcPts val="360"/>
+              </a:spcBef>
+              <a:spcAft>
+                <a:spcPts val="0"/>
+              </a:spcAft>
+              <a:buClr>
+                <a:srgbClr val="677480"/>
+              </a:buClr>
+              <a:buSzPct val="100000"/>
+              <a:buFont typeface="Lato"/>
+              <a:buNone/>
+              <a:defRPr sz="1800" b="0" i="0" u="none" strike="noStrike" cap="none">
+                <a:solidFill>
+                  <a:srgbClr val="677480"/>
+                </a:solidFill>
+                <a:latin typeface="Lato"/>
+                <a:ea typeface="Lato"/>
+                <a:cs typeface="Lato"/>
+                <a:sym typeface="Lato"/>
+                <a:rtl val="0"/>
+              </a:defRPr>
+            </a:lvl5pPr>
+            <a:lvl6pPr marR="0" lvl="5" algn="l" rtl="0">
+              <a:lnSpc>
+                <a:spcPct val="100000"/>
+              </a:lnSpc>
+              <a:spcBef>
+                <a:spcPts val="360"/>
+              </a:spcBef>
+              <a:spcAft>
+                <a:spcPts val="0"/>
+              </a:spcAft>
+              <a:buClr>
+                <a:srgbClr val="677480"/>
+              </a:buClr>
+              <a:buSzPct val="100000"/>
+              <a:buFont typeface="Lato"/>
+              <a:buNone/>
+              <a:defRPr sz="1800" b="0" i="0" u="none" strike="noStrike" cap="none">
+                <a:solidFill>
+                  <a:srgbClr val="677480"/>
+                </a:solidFill>
+                <a:latin typeface="Lato"/>
+                <a:ea typeface="Lato"/>
+                <a:cs typeface="Lato"/>
+                <a:sym typeface="Lato"/>
+                <a:rtl val="0"/>
+              </a:defRPr>
+            </a:lvl6pPr>
+            <a:lvl7pPr marR="0" lvl="6" algn="l" rtl="0">
+              <a:lnSpc>
+                <a:spcPct val="100000"/>
+              </a:lnSpc>
+              <a:spcBef>
+                <a:spcPts val="360"/>
+              </a:spcBef>
+              <a:spcAft>
+                <a:spcPts val="0"/>
+              </a:spcAft>
+              <a:buClr>
+                <a:srgbClr val="677480"/>
+              </a:buClr>
+              <a:buSzPct val="100000"/>
+              <a:buFont typeface="Lato"/>
+              <a:buNone/>
+              <a:defRPr sz="1800" b="0" i="0" u="none" strike="noStrike" cap="none">
+                <a:solidFill>
+                  <a:srgbClr val="677480"/>
+                </a:solidFill>
+                <a:latin typeface="Lato"/>
+                <a:ea typeface="Lato"/>
+                <a:cs typeface="Lato"/>
+                <a:sym typeface="Lato"/>
+                <a:rtl val="0"/>
+              </a:defRPr>
+            </a:lvl7pPr>
+            <a:lvl8pPr marR="0" lvl="7" algn="l" rtl="0">
+              <a:lnSpc>
+                <a:spcPct val="100000"/>
+              </a:lnSpc>
+              <a:spcBef>
+                <a:spcPts val="360"/>
+              </a:spcBef>
+              <a:spcAft>
+                <a:spcPts val="0"/>
+              </a:spcAft>
+              <a:buClr>
+                <a:srgbClr val="677480"/>
+              </a:buClr>
+              <a:buSzPct val="100000"/>
+              <a:buFont typeface="Lato"/>
+              <a:buNone/>
+              <a:defRPr sz="1800" b="0" i="0" u="none" strike="noStrike" cap="none">
+                <a:solidFill>
+                  <a:srgbClr val="677480"/>
+                </a:solidFill>
+                <a:latin typeface="Lato"/>
+                <a:ea typeface="Lato"/>
+                <a:cs typeface="Lato"/>
+                <a:sym typeface="Lato"/>
+                <a:rtl val="0"/>
+              </a:defRPr>
+            </a:lvl8pPr>
+            <a:lvl9pPr marR="0" lvl="8" algn="l" rtl="0">
+              <a:lnSpc>
+                <a:spcPct val="100000"/>
+              </a:lnSpc>
+              <a:spcBef>
+                <a:spcPts val="360"/>
+              </a:spcBef>
+              <a:spcAft>
+                <a:spcPts val="0"/>
+              </a:spcAft>
+              <a:buClr>
+                <a:srgbClr val="677480"/>
+              </a:buClr>
+              <a:buSzPct val="100000"/>
+              <a:buFont typeface="Lato"/>
+              <a:buNone/>
+              <a:defRPr sz="1800" b="0" i="0" u="none" strike="noStrike" cap="none">
+                <a:solidFill>
+                  <a:srgbClr val="677480"/>
+                </a:solidFill>
+                <a:latin typeface="Lato"/>
+                <a:ea typeface="Lato"/>
+                <a:cs typeface="Lato"/>
+                <a:sym typeface="Lato"/>
+                <a:rtl val="0"/>
+              </a:defRPr>
+            </a:lvl9pPr>
+          </a:lstStyle>
+          <a:p>
+            <a:pPr marL="514350" indent="-514350">
+              <a:spcBef>
+                <a:spcPts val="1200"/>
+              </a:spcBef>
+              <a:buFont typeface="+mj-lt"/>
+              <a:buAutoNum type="arabicPeriod"/>
+            </a:pPr>
+            <a:r>
+              <a:rPr lang="en-US" sz="2800" dirty="0"/>
+              <a:t>Ngoc </a:t>
+            </a:r>
+            <a:r>
+              <a:rPr lang="en-US" sz="2800" dirty="0" err="1"/>
+              <a:t>Kieu</a:t>
+            </a:r>
+            <a:r>
+              <a:rPr lang="en-US" sz="2800" dirty="0"/>
+              <a:t> Thanh Huynh – </a:t>
+            </a:r>
+            <a:r>
+              <a:rPr lang="en-US" sz="2800" dirty="0" smtClean="0"/>
+              <a:t>2688093</a:t>
+            </a:r>
+            <a:endParaRPr lang="en-US" sz="2800" dirty="0"/>
+          </a:p>
+          <a:p>
+            <a:pPr marL="514350" indent="-514350">
+              <a:spcBef>
+                <a:spcPts val="1200"/>
+              </a:spcBef>
+              <a:buFont typeface="+mj-lt"/>
+              <a:buAutoNum type="arabicPeriod"/>
+            </a:pPr>
+            <a:r>
+              <a:rPr lang="fr-FR" sz="2800" dirty="0" smtClean="0"/>
+              <a:t>Bilal Butt – 2688700</a:t>
+            </a:r>
+            <a:endParaRPr lang="en-US" sz="2800" dirty="0" smtClean="0"/>
+          </a:p>
+          <a:p>
+            <a:pPr marL="514350" indent="-514350">
+              <a:spcBef>
+                <a:spcPts val="1200"/>
+              </a:spcBef>
+              <a:buFont typeface="+mj-lt"/>
+              <a:buAutoNum type="arabicPeriod"/>
+            </a:pPr>
+            <a:r>
+              <a:rPr lang="fr-FR" sz="2800" dirty="0" smtClean="0"/>
+              <a:t>Michel </a:t>
+            </a:r>
+            <a:r>
+              <a:rPr lang="fr-FR" sz="2800" dirty="0" err="1"/>
+              <a:t>Clerger</a:t>
+            </a:r>
+            <a:r>
+              <a:rPr lang="fr-FR" sz="2800" dirty="0"/>
+              <a:t> – </a:t>
+            </a:r>
+            <a:r>
+              <a:rPr lang="fr-FR" sz="2800" dirty="0" smtClean="0"/>
+              <a:t>2694646</a:t>
+            </a:r>
+            <a:endParaRPr lang="en-US" sz="2800" dirty="0"/>
+          </a:p>
+          <a:p>
+            <a:pPr marL="514350" indent="-514350">
+              <a:spcBef>
+                <a:spcPts val="1200"/>
+              </a:spcBef>
+              <a:buFont typeface="+mj-lt"/>
+              <a:buAutoNum type="arabicPeriod"/>
+            </a:pPr>
+            <a:r>
+              <a:rPr lang="fr-FR" sz="2800" dirty="0" smtClean="0"/>
+              <a:t>Roman </a:t>
+            </a:r>
+            <a:r>
+              <a:rPr lang="fr-FR" sz="2800" dirty="0" err="1"/>
+              <a:t>Siabro</a:t>
+            </a:r>
+            <a:r>
+              <a:rPr lang="fr-FR" sz="2800" dirty="0"/>
+              <a:t> – </a:t>
+            </a:r>
+            <a:r>
+              <a:rPr lang="fr-FR" sz="2800" dirty="0" smtClean="0"/>
+              <a:t>2224489</a:t>
+            </a:r>
+            <a:endParaRPr lang="en-US" sz="2800" dirty="0" smtClean="0"/>
+          </a:p>
+          <a:p>
+            <a:pPr algn="ctr">
+              <a:spcBef>
+                <a:spcPts val="0"/>
+              </a:spcBef>
+              <a:buFont typeface="Lato"/>
+              <a:buNone/>
+            </a:pPr>
+            <a:endParaRPr lang="en" dirty="0" smtClean="0">
+              <a:solidFill>
+                <a:srgbClr val="97ABBC"/>
+              </a:solidFill>
+              <a:latin typeface="Raleway"/>
+              <a:ea typeface="Raleway"/>
+              <a:cs typeface="Raleway"/>
+              <a:sym typeface="Raleway"/>
+            </a:endParaRPr>
+          </a:p>
+        </p:txBody>
+      </p:sp>
     </p:spTree>
   </p:cSld>
   <p:clrMapOvr>
@@ -3618,7 +4019,43 @@
                 <a:cs typeface="Raleway"/>
                 <a:sym typeface="Raleway"/>
               </a:rPr>
-              <a:t>“XYZ” SYSTEMS</a:t>
+              <a:t>“</a:t>
+            </a:r>
+            <a:r>
+              <a:rPr lang="en-US" dirty="0" err="1" smtClean="0">
+                <a:solidFill>
+                  <a:srgbClr val="97ABBC"/>
+                </a:solidFill>
+                <a:latin typeface="Raleway"/>
+                <a:ea typeface="Raleway"/>
+                <a:cs typeface="Raleway"/>
+                <a:sym typeface="Raleway"/>
+              </a:rPr>
+              <a:t>LoopIT</a:t>
+            </a:r>
+            <a:r>
+              <a:rPr lang="en-US" dirty="0" smtClean="0">
+                <a:solidFill>
+                  <a:srgbClr val="97ABBC"/>
+                </a:solidFill>
+                <a:latin typeface="Raleway"/>
+                <a:ea typeface="Raleway"/>
+                <a:cs typeface="Raleway"/>
+                <a:sym typeface="Raleway"/>
+              </a:rPr>
+              <a:t>” </a:t>
+            </a:r>
+            <a:r>
+              <a:rPr lang="en-US" dirty="0" smtClean="0">
+                <a:solidFill>
+                  <a:srgbClr val="97ABBC"/>
+                </a:solidFill>
+                <a:latin typeface="Raleway"/>
+                <a:ea typeface="Raleway"/>
+                <a:cs typeface="Raleway"/>
+                <a:sym typeface="Raleway"/>
+              </a:rPr>
+              <a:t>SYSTEMS</a:t>
             </a:r>
             <a:endParaRPr lang="en" dirty="0" smtClean="0">
               <a:solidFill>

</xml_diff>